<commit_message>
add test description to technology review ppt.
</commit_message>
<xml_diff>
--- a/docs/Technology Reviews.pptx
+++ b/docs/Technology Reviews.pptx
@@ -109,7 +109,20 @@
       </a:defRPr>
     </a:lvl9pPr>
   </p:defaultTextStyle>
+  <p:extLst>
+    <p:ext uri="{EFAFB233-063F-42B5-8137-9DF3F51BA10A}">
+      <p15:sldGuideLst xmlns:p15="http://schemas.microsoft.com/office/powerpoint/2012/main"/>
+    </p:ext>
+  </p:extLst>
 </p:presentation>
+</file>
+
+<file path=ppt/revisionInfo.xml><?xml version="1.0" encoding="utf-8"?>
+<p1510:revInfo xmlns:a="http://schemas.openxmlformats.org/drawingml/2006/main" xmlns:r="http://schemas.openxmlformats.org/officeDocument/2006/relationships" xmlns:p1510="http://schemas.microsoft.com/office/powerpoint/2015/10/main">
+  <p1510:revLst>
+    <p1510:client id="{3DF8EE36-ABB9-4C58-B19E-0E679E765ADB}" v="1" dt="2024-02-08T00:12:36.376"/>
+  </p1510:revLst>
+</p1510:revInfo>
 </file>
 
 <file path=ppt/changesInfos/changesInfo1.xml><?xml version="1.0" encoding="utf-8"?>
@@ -306,6 +319,62 @@
       </pc:sldChg>
     </pc:docChg>
   </pc:docChgLst>
+  <pc:docChgLst>
+    <pc:chgData name="TED LIU" userId="3ca25400-f280-4df1-ac1e-e4c4965d380b" providerId="ADAL" clId="{3DF8EE36-ABB9-4C58-B19E-0E679E765ADB}"/>
+    <pc:docChg chg="undo custSel modSld">
+      <pc:chgData name="TED LIU" userId="3ca25400-f280-4df1-ac1e-e4c4965d380b" providerId="ADAL" clId="{3DF8EE36-ABB9-4C58-B19E-0E679E765ADB}" dt="2024-02-08T00:14:38.546" v="104" actId="1076"/>
+      <pc:docMkLst>
+        <pc:docMk/>
+      </pc:docMkLst>
+      <pc:sldChg chg="addSp modSp mod">
+        <pc:chgData name="TED LIU" userId="3ca25400-f280-4df1-ac1e-e4c4965d380b" providerId="ADAL" clId="{3DF8EE36-ABB9-4C58-B19E-0E679E765ADB}" dt="2024-02-08T00:14:38.546" v="104" actId="1076"/>
+        <pc:sldMkLst>
+          <pc:docMk/>
+          <pc:sldMk cId="1512874680" sldId="263"/>
+        </pc:sldMkLst>
+        <pc:spChg chg="mod">
+          <ac:chgData name="TED LIU" userId="3ca25400-f280-4df1-ac1e-e4c4965d380b" providerId="ADAL" clId="{3DF8EE36-ABB9-4C58-B19E-0E679E765ADB}" dt="2024-02-08T00:14:38.546" v="104" actId="1076"/>
+          <ac:spMkLst>
+            <pc:docMk/>
+            <pc:sldMk cId="1512874680" sldId="263"/>
+            <ac:spMk id="3" creationId="{31957DC0-C79B-6148-D37E-504E6EDF4FC6}"/>
+          </ac:spMkLst>
+        </pc:spChg>
+        <pc:spChg chg="mod">
+          <ac:chgData name="TED LIU" userId="3ca25400-f280-4df1-ac1e-e4c4965d380b" providerId="ADAL" clId="{3DF8EE36-ABB9-4C58-B19E-0E679E765ADB}" dt="2024-02-08T00:14:38.546" v="104" actId="1076"/>
+          <ac:spMkLst>
+            <pc:docMk/>
+            <pc:sldMk cId="1512874680" sldId="263"/>
+            <ac:spMk id="4" creationId="{47263B41-0C60-E68D-89AD-14B3C082B849}"/>
+          </ac:spMkLst>
+        </pc:spChg>
+        <pc:spChg chg="mod">
+          <ac:chgData name="TED LIU" userId="3ca25400-f280-4df1-ac1e-e4c4965d380b" providerId="ADAL" clId="{3DF8EE36-ABB9-4C58-B19E-0E679E765ADB}" dt="2024-02-08T00:14:38.546" v="104" actId="1076"/>
+          <ac:spMkLst>
+            <pc:docMk/>
+            <pc:sldMk cId="1512874680" sldId="263"/>
+            <ac:spMk id="5" creationId="{3CFD9176-D258-797A-FEBF-624CB59E2FD1}"/>
+          </ac:spMkLst>
+        </pc:spChg>
+        <pc:spChg chg="mod">
+          <ac:chgData name="TED LIU" userId="3ca25400-f280-4df1-ac1e-e4c4965d380b" providerId="ADAL" clId="{3DF8EE36-ABB9-4C58-B19E-0E679E765ADB}" dt="2024-02-08T00:14:38.546" v="104" actId="1076"/>
+          <ac:spMkLst>
+            <pc:docMk/>
+            <pc:sldMk cId="1512874680" sldId="263"/>
+            <ac:spMk id="6" creationId="{5CBB408F-FB2D-7F71-5985-09D04C0D489D}"/>
+          </ac:spMkLst>
+        </pc:spChg>
+        <pc:spChg chg="add mod">
+          <ac:chgData name="TED LIU" userId="3ca25400-f280-4df1-ac1e-e4c4965d380b" providerId="ADAL" clId="{3DF8EE36-ABB9-4C58-B19E-0E679E765ADB}" dt="2024-02-08T00:14:07.952" v="101" actId="20577"/>
+          <ac:spMkLst>
+            <pc:docMk/>
+            <pc:sldMk cId="1512874680" sldId="263"/>
+            <ac:spMk id="7" creationId="{BFA7A10D-8FFF-E607-5026-4E8CE0DB853C}"/>
+          </ac:spMkLst>
+        </pc:spChg>
+      </pc:sldChg>
+    </pc:docChg>
+  </pc:docChgLst>
 </pc:chgInfo>
 </file>
 
@@ -456,7 +525,7 @@
           <a:p>
             <a:fld id="{E13813BD-F966-44A3-AE59-327A7FA7B531}" type="datetimeFigureOut">
               <a:rPr lang="en-US" smtClean="0"/>
-              <a:t>2/6/2024</a:t>
+              <a:t>2/7/2024</a:t>
             </a:fld>
             <a:endParaRPr lang="en-US"/>
           </a:p>
@@ -654,7 +723,7 @@
           <a:p>
             <a:fld id="{E13813BD-F966-44A3-AE59-327A7FA7B531}" type="datetimeFigureOut">
               <a:rPr lang="en-US" smtClean="0"/>
-              <a:t>2/6/2024</a:t>
+              <a:t>2/7/2024</a:t>
             </a:fld>
             <a:endParaRPr lang="en-US"/>
           </a:p>
@@ -862,7 +931,7 @@
           <a:p>
             <a:fld id="{E13813BD-F966-44A3-AE59-327A7FA7B531}" type="datetimeFigureOut">
               <a:rPr lang="en-US" smtClean="0"/>
-              <a:t>2/6/2024</a:t>
+              <a:t>2/7/2024</a:t>
             </a:fld>
             <a:endParaRPr lang="en-US"/>
           </a:p>
@@ -1060,7 +1129,7 @@
           <a:p>
             <a:fld id="{E13813BD-F966-44A3-AE59-327A7FA7B531}" type="datetimeFigureOut">
               <a:rPr lang="en-US" smtClean="0"/>
-              <a:t>2/6/2024</a:t>
+              <a:t>2/7/2024</a:t>
             </a:fld>
             <a:endParaRPr lang="en-US"/>
           </a:p>
@@ -1335,7 +1404,7 @@
           <a:p>
             <a:fld id="{E13813BD-F966-44A3-AE59-327A7FA7B531}" type="datetimeFigureOut">
               <a:rPr lang="en-US" smtClean="0"/>
-              <a:t>2/6/2024</a:t>
+              <a:t>2/7/2024</a:t>
             </a:fld>
             <a:endParaRPr lang="en-US"/>
           </a:p>
@@ -1600,7 +1669,7 @@
           <a:p>
             <a:fld id="{E13813BD-F966-44A3-AE59-327A7FA7B531}" type="datetimeFigureOut">
               <a:rPr lang="en-US" smtClean="0"/>
-              <a:t>2/6/2024</a:t>
+              <a:t>2/7/2024</a:t>
             </a:fld>
             <a:endParaRPr lang="en-US"/>
           </a:p>
@@ -2012,7 +2081,7 @@
           <a:p>
             <a:fld id="{E13813BD-F966-44A3-AE59-327A7FA7B531}" type="datetimeFigureOut">
               <a:rPr lang="en-US" smtClean="0"/>
-              <a:t>2/6/2024</a:t>
+              <a:t>2/7/2024</a:t>
             </a:fld>
             <a:endParaRPr lang="en-US"/>
           </a:p>
@@ -2153,7 +2222,7 @@
           <a:p>
             <a:fld id="{E13813BD-F966-44A3-AE59-327A7FA7B531}" type="datetimeFigureOut">
               <a:rPr lang="en-US" smtClean="0"/>
-              <a:t>2/6/2024</a:t>
+              <a:t>2/7/2024</a:t>
             </a:fld>
             <a:endParaRPr lang="en-US"/>
           </a:p>
@@ -2266,7 +2335,7 @@
           <a:p>
             <a:fld id="{E13813BD-F966-44A3-AE59-327A7FA7B531}" type="datetimeFigureOut">
               <a:rPr lang="en-US" smtClean="0"/>
-              <a:t>2/6/2024</a:t>
+              <a:t>2/7/2024</a:t>
             </a:fld>
             <a:endParaRPr lang="en-US"/>
           </a:p>
@@ -2577,7 +2646,7 @@
           <a:p>
             <a:fld id="{E13813BD-F966-44A3-AE59-327A7FA7B531}" type="datetimeFigureOut">
               <a:rPr lang="en-US" smtClean="0"/>
-              <a:t>2/6/2024</a:t>
+              <a:t>2/7/2024</a:t>
             </a:fld>
             <a:endParaRPr lang="en-US"/>
           </a:p>
@@ -2865,7 +2934,7 @@
           <a:p>
             <a:fld id="{E13813BD-F966-44A3-AE59-327A7FA7B531}" type="datetimeFigureOut">
               <a:rPr lang="en-US" smtClean="0"/>
-              <a:t>2/6/2024</a:t>
+              <a:t>2/7/2024</a:t>
             </a:fld>
             <a:endParaRPr lang="en-US"/>
           </a:p>
@@ -3106,7 +3175,7 @@
           <a:p>
             <a:fld id="{E13813BD-F966-44A3-AE59-327A7FA7B531}" type="datetimeFigureOut">
               <a:rPr lang="en-US" smtClean="0"/>
-              <a:t>2/6/2024</a:t>
+              <a:t>2/7/2024</a:t>
             </a:fld>
             <a:endParaRPr lang="en-US"/>
           </a:p>
@@ -4039,7 +4108,12 @@
             <p:ph type="body" idx="1"/>
           </p:nvPr>
         </p:nvSpPr>
-        <p:spPr/>
+        <p:spPr>
+          <a:xfrm>
+            <a:off x="827088" y="1826039"/>
+            <a:ext cx="5157787" cy="823912"/>
+          </a:xfrm>
+        </p:spPr>
         <p:txBody>
           <a:bodyPr/>
           <a:lstStyle/>
@@ -4067,7 +4141,12 @@
             <p:ph sz="half" idx="2"/>
           </p:nvPr>
         </p:nvSpPr>
-        <p:spPr/>
+        <p:spPr>
+          <a:xfrm>
+            <a:off x="827088" y="2649951"/>
+            <a:ext cx="5157787" cy="3684588"/>
+          </a:xfrm>
+        </p:spPr>
         <p:txBody>
           <a:bodyPr>
             <a:normAutofit/>
@@ -4123,7 +4202,12 @@
             <p:ph type="body" sz="quarter" idx="3"/>
           </p:nvPr>
         </p:nvSpPr>
-        <p:spPr/>
+        <p:spPr>
+          <a:xfrm>
+            <a:off x="6159500" y="1826039"/>
+            <a:ext cx="5183188" cy="823912"/>
+          </a:xfrm>
+        </p:spPr>
         <p:txBody>
           <a:bodyPr/>
           <a:lstStyle/>
@@ -4152,7 +4236,12 @@
             <p:ph sz="quarter" idx="4"/>
           </p:nvPr>
         </p:nvSpPr>
-        <p:spPr/>
+        <p:spPr>
+          <a:xfrm>
+            <a:off x="6159500" y="2649951"/>
+            <a:ext cx="5183188" cy="3684588"/>
+          </a:xfrm>
+        </p:spPr>
         <p:txBody>
           <a:bodyPr>
             <a:normAutofit/>
@@ -4188,6 +4277,60 @@
             <a:r>
               <a:rPr lang="en-US" dirty="0"/>
               <a:t>More focused on statistical analysis, providing lots of details on model results</a:t>
+            </a:r>
+          </a:p>
+        </p:txBody>
+      </p:sp>
+      <p:sp>
+        <p:nvSpPr>
+          <p:cNvPr id="7" name="Title 1">
+            <a:extLst>
+              <a:ext uri="{FF2B5EF4-FFF2-40B4-BE49-F238E27FC236}">
+                <a16:creationId xmlns:a16="http://schemas.microsoft.com/office/drawing/2014/main" id="{BFA7A10D-8FFF-E607-5026-4E8CE0DB853C}"/>
+              </a:ext>
+            </a:extLst>
+          </p:cNvPr>
+          <p:cNvSpPr txBox="1">
+            <a:spLocks/>
+          </p:cNvSpPr>
+          <p:nvPr/>
+        </p:nvSpPr>
+        <p:spPr>
+          <a:xfrm>
+            <a:off x="827088" y="1435893"/>
+            <a:ext cx="10515600" cy="1325563"/>
+          </a:xfrm>
+          <a:prstGeom prst="rect">
+            <a:avLst/>
+          </a:prstGeom>
+        </p:spPr>
+        <p:txBody>
+          <a:bodyPr vert="horz" lIns="91440" tIns="45720" rIns="91440" bIns="45720" rtlCol="0" anchor="t">
+            <a:normAutofit/>
+          </a:bodyPr>
+          <a:lstStyle>
+            <a:lvl1pPr algn="l" defTabSz="914400" rtl="0" eaLnBrk="1" latinLnBrk="0" hangingPunct="1">
+              <a:lnSpc>
+                <a:spcPct val="90000"/>
+              </a:lnSpc>
+              <a:spcBef>
+                <a:spcPct val="0"/>
+              </a:spcBef>
+              <a:buNone/>
+              <a:defRPr sz="4400" kern="1200">
+                <a:solidFill>
+                  <a:schemeClr val="tx1"/>
+                </a:solidFill>
+                <a:latin typeface="+mj-lt"/>
+                <a:ea typeface="+mj-ea"/>
+                <a:cs typeface="+mj-cs"/>
+              </a:defRPr>
+            </a:lvl1pPr>
+          </a:lstStyle>
+          <a:p>
+            <a:r>
+              <a:rPr lang="en-US" sz="2400" dirty="0"/>
+              <a:t>Test: 1000 samples, 20 features (independent variables), 2 groups</a:t>
             </a:r>
           </a:p>
         </p:txBody>

</xml_diff>